<commit_message>
add some remarks to the semi-automatic slides
</commit_message>
<xml_diff>
--- a/MF1833061-沈思远 课程报告/课程报告.pptx
+++ b/MF1833061-沈思远 课程报告/课程报告.pptx
@@ -216,7 +216,7 @@
           <a:p>
             <a:fld id="{90E872AE-70C9-46AC-9706-4BC073558D48}" type="datetimeFigureOut">
               <a:rPr lang="zh-CN" altLang="en-US" smtClean="0"/>
-              <a:t>2020/5/7</a:t>
+              <a:t>2020/5/8</a:t>
             </a:fld>
             <a:endParaRPr lang="zh-CN" altLang="en-US"/>
           </a:p>
@@ -807,7 +807,10 @@
           <a:bodyPr/>
           <a:lstStyle/>
           <a:p>
-            <a:endParaRPr lang="zh-CN" altLang="en-US" dirty="0"/>
+            <a:r>
+              <a:rPr lang="zh-CN" altLang="en-US" dirty="0"/>
+              <a:t>泛化重构的方式（重组面向对象的源代码以最大利用泛化的能力），</a:t>
+            </a:r>
           </a:p>
         </p:txBody>
       </p:sp>
@@ -891,7 +894,117 @@
           <a:bodyPr/>
           <a:lstStyle/>
           <a:p>
+            <a:r>
+              <a:rPr lang="zh-CN" altLang="en-US" dirty="0"/>
+              <a:t>首先对于不同类组成的类对经过粗略的选择形成候选类对</a:t>
+            </a:r>
+            <a:endParaRPr lang="en-US" altLang="zh-CN" dirty="0"/>
+          </a:p>
+          <a:p>
+            <a:r>
+              <a:rPr lang="zh-CN" altLang="en-US" dirty="0"/>
+              <a:t>然后计算类对中类与类结构上的相似性，然后对于相似程度较大的类根据继承关系分为不同的类别</a:t>
+            </a:r>
+            <a:endParaRPr lang="en-US" altLang="zh-CN" dirty="0"/>
+          </a:p>
+          <a:p>
+            <a:r>
+              <a:rPr lang="en-US" altLang="zh-CN" dirty="0"/>
+              <a:t>Root class</a:t>
+            </a:r>
+            <a:r>
+              <a:rPr lang="zh-CN" altLang="en-US" dirty="0"/>
+              <a:t>：</a:t>
+            </a:r>
+            <a:r>
+              <a:rPr lang="en-US" altLang="zh-CN" dirty="0"/>
+              <a:t>c1</a:t>
+            </a:r>
+            <a:r>
+              <a:rPr lang="zh-CN" altLang="en-US" dirty="0"/>
+              <a:t>和</a:t>
+            </a:r>
+            <a:r>
+              <a:rPr lang="en-US" altLang="zh-CN" dirty="0"/>
+              <a:t>c2</a:t>
+            </a:r>
+            <a:r>
+              <a:rPr lang="zh-CN" altLang="en-US" dirty="0"/>
+              <a:t>无除了</a:t>
+            </a:r>
+            <a:r>
+              <a:rPr lang="en-US" altLang="zh-CN" dirty="0"/>
+              <a:t>Object</a:t>
+            </a:r>
+            <a:r>
+              <a:rPr lang="zh-CN" altLang="en-US" dirty="0"/>
+              <a:t>类外无共同祖先，那么可以设计一个新的父类包含两个类的共同行为，然后进行继承</a:t>
+            </a:r>
+            <a:endParaRPr lang="en-US" altLang="zh-CN" dirty="0"/>
+          </a:p>
+          <a:p>
+            <a:r>
+              <a:rPr lang="en-US" altLang="zh-CN" dirty="0"/>
+              <a:t>Sibling class</a:t>
+            </a:r>
+            <a:r>
+              <a:rPr lang="zh-CN" altLang="en-US" dirty="0"/>
+              <a:t>；两个类有相同的直接父类，那么可以把相同的成员变量或函数进行上移</a:t>
+            </a:r>
+            <a:endParaRPr lang="en-US" altLang="zh-CN" i="0" dirty="0"/>
+          </a:p>
+          <a:p>
+            <a:r>
+              <a:rPr lang="en-US" altLang="zh-CN" i="1" dirty="0"/>
+              <a:t>unrelated classes</a:t>
+            </a:r>
+            <a:r>
+              <a:rPr lang="zh-CN" altLang="en-US" i="1" dirty="0"/>
+              <a:t>：两个类的直接父类均不是</a:t>
+            </a:r>
+            <a:r>
+              <a:rPr lang="en-US" altLang="zh-CN" i="1" dirty="0"/>
+              <a:t>Object</a:t>
+            </a:r>
+            <a:r>
+              <a:rPr lang="zh-CN" altLang="en-US" i="1" dirty="0"/>
+              <a:t>类且不相同，这时候可以将它们的共同行为封装成一个接口</a:t>
+            </a:r>
+            <a:endParaRPr lang="en-US" altLang="zh-CN" i="1" dirty="0"/>
+          </a:p>
+          <a:p>
+            <a:pPr marL="0" marR="0" lvl="0" indent="0" algn="l" defTabSz="914400" rtl="0" eaLnBrk="1" fontAlgn="auto" latinLnBrk="0" hangingPunct="1">
+              <a:lnSpc>
+                <a:spcPct val="100000"/>
+              </a:lnSpc>
+              <a:spcBef>
+                <a:spcPts val="0"/>
+              </a:spcBef>
+              <a:spcAft>
+                <a:spcPts val="0"/>
+              </a:spcAft>
+              <a:buClrTx/>
+              <a:buSzTx/>
+              <a:buFontTx/>
+              <a:buNone/>
+              <a:tabLst/>
+              <a:defRPr/>
+            </a:pPr>
+            <a:r>
+              <a:rPr lang="en-US" altLang="zh-CN" i="1" dirty="0"/>
+              <a:t>offspring of the same ancestor</a:t>
+            </a:r>
+            <a:r>
+              <a:rPr lang="zh-CN" altLang="en-US" i="1" dirty="0"/>
+              <a:t>：两个类有非父类的相同祖先，也是将相同方法进行接口的封装</a:t>
+            </a:r>
             <a:endParaRPr lang="zh-CN" altLang="en-US" dirty="0"/>
+          </a:p>
+          <a:p>
+            <a:endParaRPr lang="en-US" altLang="zh-CN" i="1" dirty="0"/>
+          </a:p>
+          <a:p>
+            <a:endParaRPr lang="en-US" altLang="zh-CN" i="1" dirty="0"/>
           </a:p>
         </p:txBody>
       </p:sp>
@@ -1688,7 +1801,7 @@
           <a:p>
             <a:fld id="{D7D94BF0-FE24-4E84-BEA5-B0EBF192CBAF}" type="datetimeFigureOut">
               <a:rPr lang="zh-CN" altLang="en-US" smtClean="0"/>
-              <a:t>2020/5/7</a:t>
+              <a:t>2020/5/8</a:t>
             </a:fld>
             <a:endParaRPr lang="zh-CN" altLang="en-US"/>
           </a:p>
@@ -1886,7 +1999,7 @@
           <a:p>
             <a:fld id="{D7D94BF0-FE24-4E84-BEA5-B0EBF192CBAF}" type="datetimeFigureOut">
               <a:rPr lang="zh-CN" altLang="en-US" smtClean="0"/>
-              <a:t>2020/5/7</a:t>
+              <a:t>2020/5/8</a:t>
             </a:fld>
             <a:endParaRPr lang="zh-CN" altLang="en-US"/>
           </a:p>
@@ -2094,7 +2207,7 @@
           <a:p>
             <a:fld id="{D7D94BF0-FE24-4E84-BEA5-B0EBF192CBAF}" type="datetimeFigureOut">
               <a:rPr lang="zh-CN" altLang="en-US" smtClean="0"/>
-              <a:t>2020/5/7</a:t>
+              <a:t>2020/5/8</a:t>
             </a:fld>
             <a:endParaRPr lang="zh-CN" altLang="en-US"/>
           </a:p>
@@ -2292,7 +2405,7 @@
           <a:p>
             <a:fld id="{D7D94BF0-FE24-4E84-BEA5-B0EBF192CBAF}" type="datetimeFigureOut">
               <a:rPr lang="zh-CN" altLang="en-US" smtClean="0"/>
-              <a:t>2020/5/7</a:t>
+              <a:t>2020/5/8</a:t>
             </a:fld>
             <a:endParaRPr lang="zh-CN" altLang="en-US"/>
           </a:p>
@@ -2567,7 +2680,7 @@
           <a:p>
             <a:fld id="{D7D94BF0-FE24-4E84-BEA5-B0EBF192CBAF}" type="datetimeFigureOut">
               <a:rPr lang="zh-CN" altLang="en-US" smtClean="0"/>
-              <a:t>2020/5/7</a:t>
+              <a:t>2020/5/8</a:t>
             </a:fld>
             <a:endParaRPr lang="zh-CN" altLang="en-US"/>
           </a:p>
@@ -2832,7 +2945,7 @@
           <a:p>
             <a:fld id="{D7D94BF0-FE24-4E84-BEA5-B0EBF192CBAF}" type="datetimeFigureOut">
               <a:rPr lang="zh-CN" altLang="en-US" smtClean="0"/>
-              <a:t>2020/5/7</a:t>
+              <a:t>2020/5/8</a:t>
             </a:fld>
             <a:endParaRPr lang="zh-CN" altLang="en-US"/>
           </a:p>
@@ -3244,7 +3357,7 @@
           <a:p>
             <a:fld id="{D7D94BF0-FE24-4E84-BEA5-B0EBF192CBAF}" type="datetimeFigureOut">
               <a:rPr lang="zh-CN" altLang="en-US" smtClean="0"/>
-              <a:t>2020/5/7</a:t>
+              <a:t>2020/5/8</a:t>
             </a:fld>
             <a:endParaRPr lang="zh-CN" altLang="en-US"/>
           </a:p>
@@ -3385,7 +3498,7 @@
           <a:p>
             <a:fld id="{D7D94BF0-FE24-4E84-BEA5-B0EBF192CBAF}" type="datetimeFigureOut">
               <a:rPr lang="zh-CN" altLang="en-US" smtClean="0"/>
-              <a:t>2020/5/7</a:t>
+              <a:t>2020/5/8</a:t>
             </a:fld>
             <a:endParaRPr lang="zh-CN" altLang="en-US"/>
           </a:p>
@@ -3498,7 +3611,7 @@
           <a:p>
             <a:fld id="{D7D94BF0-FE24-4E84-BEA5-B0EBF192CBAF}" type="datetimeFigureOut">
               <a:rPr lang="zh-CN" altLang="en-US" smtClean="0"/>
-              <a:t>2020/5/7</a:t>
+              <a:t>2020/5/8</a:t>
             </a:fld>
             <a:endParaRPr lang="zh-CN" altLang="en-US"/>
           </a:p>
@@ -3809,7 +3922,7 @@
           <a:p>
             <a:fld id="{D7D94BF0-FE24-4E84-BEA5-B0EBF192CBAF}" type="datetimeFigureOut">
               <a:rPr lang="zh-CN" altLang="en-US" smtClean="0"/>
-              <a:t>2020/5/7</a:t>
+              <a:t>2020/5/8</a:t>
             </a:fld>
             <a:endParaRPr lang="zh-CN" altLang="en-US"/>
           </a:p>
@@ -4097,7 +4210,7 @@
           <a:p>
             <a:fld id="{D7D94BF0-FE24-4E84-BEA5-B0EBF192CBAF}" type="datetimeFigureOut">
               <a:rPr lang="zh-CN" altLang="en-US" smtClean="0"/>
-              <a:t>2020/5/7</a:t>
+              <a:t>2020/5/8</a:t>
             </a:fld>
             <a:endParaRPr lang="zh-CN" altLang="en-US"/>
           </a:p>
@@ -4338,7 +4451,7 @@
           <a:p>
             <a:fld id="{D7D94BF0-FE24-4E84-BEA5-B0EBF192CBAF}" type="datetimeFigureOut">
               <a:rPr lang="zh-CN" altLang="en-US" smtClean="0"/>
-              <a:t>2020/5/7</a:t>
+              <a:t>2020/5/8</a:t>
             </a:fld>
             <a:endParaRPr lang="zh-CN" altLang="en-US"/>
           </a:p>
@@ -4940,6 +5053,34 @@
               <a:rPr lang="en-US" altLang="zh-CN" dirty="0"/>
               <a:t>recommends a list of refactoring opportunities</a:t>
             </a:r>
+          </a:p>
+          <a:p>
+            <a:pPr lvl="2"/>
+            <a:r>
+              <a:rPr lang="en-US" altLang="zh-CN" i="1" dirty="0"/>
+              <a:t>root classes</a:t>
+            </a:r>
+          </a:p>
+          <a:p>
+            <a:pPr lvl="2"/>
+            <a:r>
+              <a:rPr lang="en-US" altLang="zh-CN" i="1" dirty="0"/>
+              <a:t>sibling classes</a:t>
+            </a:r>
+          </a:p>
+          <a:p>
+            <a:pPr lvl="2"/>
+            <a:r>
+              <a:rPr lang="en-US" altLang="zh-CN" i="1" dirty="0"/>
+              <a:t>unrelated classes</a:t>
+            </a:r>
+          </a:p>
+          <a:p>
+            <a:pPr lvl="2"/>
+            <a:r>
+              <a:rPr lang="en-US" altLang="zh-CN" i="1" dirty="0"/>
+              <a:t>offspring of the same ancestor</a:t>
+            </a:r>
             <a:endParaRPr lang="zh-CN" altLang="en-US" dirty="0"/>
           </a:p>
         </p:txBody>
@@ -5867,7 +6008,7 @@
         <p:spPr>
           <a:xfrm>
             <a:off x="838200" y="3429000"/>
-            <a:ext cx="7334250" cy="2266950"/>
+            <a:ext cx="9785684" cy="3024666"/>
           </a:xfrm>
           <a:prstGeom prst="rect">
             <a:avLst/>
@@ -6089,6 +6230,12 @@
             <a:r>
               <a:rPr lang="en-US" altLang="zh-CN" dirty="0"/>
               <a:t>Introduce different types of code smell detection approaches</a:t>
+            </a:r>
+          </a:p>
+          <a:p>
+            <a:r>
+              <a:rPr lang="en-US" altLang="zh-CN" dirty="0"/>
+              <a:t>Most approaches are based on distance metric</a:t>
             </a:r>
             <a:endParaRPr lang="zh-CN" altLang="en-US" dirty="0"/>
           </a:p>

</xml_diff>